<commit_message>
Update FOlien gemäß Vorschlag Matthias
</commit_message>
<xml_diff>
--- a/präsentationen/Meilenstein3_Praesentation_Entwurf_.pptx
+++ b/präsentationen/Meilenstein3_Praesentation_Entwurf_.pptx
@@ -6,7 +6,7 @@
     <p:sldMasterId id="2147483672" r:id="rId2"/>
   </p:sldMasterIdLst>
   <p:notesMasterIdLst>
-    <p:notesMasterId r:id="rId40"/>
+    <p:notesMasterId r:id="rId42"/>
   </p:notesMasterIdLst>
   <p:sldIdLst>
     <p:sldId id="2582" r:id="rId3"/>
@@ -38,14 +38,16 @@
     <p:sldId id="2636" r:id="rId29"/>
     <p:sldId id="2695" r:id="rId30"/>
     <p:sldId id="2697" r:id="rId31"/>
-    <p:sldId id="2694" r:id="rId32"/>
-    <p:sldId id="2698" r:id="rId33"/>
-    <p:sldId id="2699" r:id="rId34"/>
-    <p:sldId id="2700" r:id="rId35"/>
-    <p:sldId id="2701" r:id="rId36"/>
-    <p:sldId id="2693" r:id="rId37"/>
-    <p:sldId id="2631" r:id="rId38"/>
-    <p:sldId id="2632" r:id="rId39"/>
+    <p:sldId id="2702" r:id="rId32"/>
+    <p:sldId id="2694" r:id="rId33"/>
+    <p:sldId id="2698" r:id="rId34"/>
+    <p:sldId id="2699" r:id="rId35"/>
+    <p:sldId id="2700" r:id="rId36"/>
+    <p:sldId id="2703" r:id="rId37"/>
+    <p:sldId id="2701" r:id="rId38"/>
+    <p:sldId id="2693" r:id="rId39"/>
+    <p:sldId id="2631" r:id="rId40"/>
+    <p:sldId id="2632" r:id="rId41"/>
   </p:sldIdLst>
   <p:sldSz cx="12192000" cy="6858000"/>
   <p:notesSz cx="6858000" cy="9144000"/>
@@ -178,10 +180,12 @@
             <p14:sldId id="2636"/>
             <p14:sldId id="2695"/>
             <p14:sldId id="2697"/>
+            <p14:sldId id="2702"/>
             <p14:sldId id="2694"/>
             <p14:sldId id="2698"/>
             <p14:sldId id="2699"/>
             <p14:sldId id="2700"/>
+            <p14:sldId id="2703"/>
             <p14:sldId id="2701"/>
             <p14:sldId id="2693"/>
             <p14:sldId id="2631"/>
@@ -278,7 +282,7 @@
           </a:lstStyle>
           <a:p>
             <a:fld id="{75BEE995-72F4-482A-B547-037217EEA661}" type="datetimeFigureOut">
-              <a:t>23.06.2025</a:t>
+              <a:t>24.06.2025</a:t>
             </a:fld>
             <a:endParaRPr lang="de-DE"/>
           </a:p>
@@ -1930,117 +1934,7 @@
         <p:cNvPr id="1" name="">
           <a:extLst>
             <a:ext uri="{FF2B5EF4-FFF2-40B4-BE49-F238E27FC236}">
-              <a16:creationId xmlns:a16="http://schemas.microsoft.com/office/drawing/2014/main" id="{7D1D5C83-C1E5-69B4-9CBD-F48D27F30011}"/>
-            </a:ext>
-          </a:extLst>
-        </p:cNvPr>
-        <p:cNvGrpSpPr/>
-        <p:nvPr/>
-      </p:nvGrpSpPr>
-      <p:grpSpPr>
-        <a:xfrm>
-          <a:off x="0" y="0"/>
-          <a:ext cx="0" cy="0"/>
-          <a:chOff x="0" y="0"/>
-          <a:chExt cx="0" cy="0"/>
-        </a:xfrm>
-      </p:grpSpPr>
-      <p:sp>
-        <p:nvSpPr>
-          <p:cNvPr id="2" name="Folienbildplatzhalter 1">
-            <a:extLst>
-              <a:ext uri="{FF2B5EF4-FFF2-40B4-BE49-F238E27FC236}">
-                <a16:creationId xmlns:a16="http://schemas.microsoft.com/office/drawing/2014/main" id="{10E100BD-441E-6730-43F1-7936DAE7494C}"/>
-              </a:ext>
-            </a:extLst>
-          </p:cNvPr>
-          <p:cNvSpPr>
-            <a:spLocks noGrp="1" noRot="1" noChangeAspect="1"/>
-          </p:cNvSpPr>
-          <p:nvPr>
-            <p:ph type="sldImg"/>
-          </p:nvPr>
-        </p:nvSpPr>
-        <p:spPr/>
-      </p:sp>
-      <p:sp>
-        <p:nvSpPr>
-          <p:cNvPr id="3" name="Notizenplatzhalter 2">
-            <a:extLst>
-              <a:ext uri="{FF2B5EF4-FFF2-40B4-BE49-F238E27FC236}">
-                <a16:creationId xmlns:a16="http://schemas.microsoft.com/office/drawing/2014/main" id="{6FA3B23C-CBFF-C6EE-8B98-14E672AB58C0}"/>
-              </a:ext>
-            </a:extLst>
-          </p:cNvPr>
-          <p:cNvSpPr>
-            <a:spLocks noGrp="1"/>
-          </p:cNvSpPr>
-          <p:nvPr>
-            <p:ph type="body" idx="1"/>
-          </p:nvPr>
-        </p:nvSpPr>
-        <p:spPr/>
-        <p:txBody>
-          <a:bodyPr/>
-          <a:lstStyle/>
-          <a:p>
-            <a:r>
-              <a:rPr lang="de-DE"/>
-              <a:t>Hier beginnen wir mit dem Hintergrund und der Motivation für unser Projekt. Wir geben einen Überblick über die Einzelhandelsbranche und erläutern die Zielsetzung unseres Data Science Projekts, um Prozesse zu optimieren und die Effizienz zu steigern.</a:t>
-            </a:r>
-          </a:p>
-        </p:txBody>
-      </p:sp>
-      <p:sp>
-        <p:nvSpPr>
-          <p:cNvPr id="4" name="Foliennummernplatzhalter 3">
-            <a:extLst>
-              <a:ext uri="{FF2B5EF4-FFF2-40B4-BE49-F238E27FC236}">
-                <a16:creationId xmlns:a16="http://schemas.microsoft.com/office/drawing/2014/main" id="{8D321C24-4021-BA5E-5063-DE14E5ECA4EC}"/>
-              </a:ext>
-            </a:extLst>
-          </p:cNvPr>
-          <p:cNvSpPr>
-            <a:spLocks noGrp="1"/>
-          </p:cNvSpPr>
-          <p:nvPr>
-            <p:ph type="sldNum" sz="quarter" idx="5"/>
-          </p:nvPr>
-        </p:nvSpPr>
-        <p:spPr/>
-        <p:txBody>
-          <a:bodyPr/>
-          <a:lstStyle/>
-          <a:p>
-            <a:fld id="{8C36BA74-7AA1-48ED-B9BC-0F570D47A936}" type="slidenum">
-              <a:t>30</a:t>
-            </a:fld>
-            <a:endParaRPr lang="de-DE"/>
-          </a:p>
-        </p:txBody>
-      </p:sp>
-    </p:spTree>
-    <p:extLst>
-      <p:ext uri="{BB962C8B-B14F-4D97-AF65-F5344CB8AC3E}">
-        <p14:creationId xmlns:p14="http://schemas.microsoft.com/office/powerpoint/2010/main" val="1912491895"/>
-      </p:ext>
-    </p:extLst>
-  </p:cSld>
-  <p:clrMapOvr>
-    <a:masterClrMapping/>
-  </p:clrMapOvr>
-</p:notes>
-</file>
-
-<file path=ppt/notesSlides/notesSlide19.xml><?xml version="1.0" encoding="utf-8"?>
-<p:notes xmlns:a="http://schemas.openxmlformats.org/drawingml/2006/main" xmlns:r="http://schemas.openxmlformats.org/officeDocument/2006/relationships" xmlns:p="http://schemas.openxmlformats.org/presentationml/2006/main">
-  <p:cSld>
-    <p:spTree>
-      <p:nvGrpSpPr>
-        <p:cNvPr id="1" name="">
-          <a:extLst>
-            <a:ext uri="{FF2B5EF4-FFF2-40B4-BE49-F238E27FC236}">
-              <a16:creationId xmlns:a16="http://schemas.microsoft.com/office/drawing/2014/main" id="{83E06739-1567-B389-27EB-96890F9ECD30}"/>
+              <a16:creationId xmlns:a16="http://schemas.microsoft.com/office/drawing/2014/main" id="{D54197A9-3A08-8138-3B9E-2BB85FA21840}"/>
             </a:ext>
           </a:extLst>
         </p:cNvPr>
@@ -2060,7 +1954,7 @@
           <p:cNvPr id="139090186" name="Slide Image Placeholder 1">
             <a:extLst>
               <a:ext uri="{FF2B5EF4-FFF2-40B4-BE49-F238E27FC236}">
-                <a16:creationId xmlns:a16="http://schemas.microsoft.com/office/drawing/2014/main" id="{932D7566-9A6D-225F-EA98-70101BF44016}"/>
+                <a16:creationId xmlns:a16="http://schemas.microsoft.com/office/drawing/2014/main" id="{8AA4346E-9454-E11B-994F-C04C794218AC}"/>
               </a:ext>
             </a:extLst>
           </p:cNvPr>
@@ -2078,7 +1972,7 @@
           <p:cNvPr id="400293583" name="Notes Placeholder 2">
             <a:extLst>
               <a:ext uri="{FF2B5EF4-FFF2-40B4-BE49-F238E27FC236}">
-                <a16:creationId xmlns:a16="http://schemas.microsoft.com/office/drawing/2014/main" id="{F2073CA3-EE16-2C99-C6C6-07A0340AA00B}"/>
+                <a16:creationId xmlns:a16="http://schemas.microsoft.com/office/drawing/2014/main" id="{CC09FF6F-C58C-896A-5D0B-3D139EC960CC}"/>
               </a:ext>
             </a:extLst>
           </p:cNvPr>
@@ -2106,7 +2000,7 @@
           <p:cNvPr id="1257388043" name="Slide Number Placeholder 3">
             <a:extLst>
               <a:ext uri="{FF2B5EF4-FFF2-40B4-BE49-F238E27FC236}">
-                <a16:creationId xmlns:a16="http://schemas.microsoft.com/office/drawing/2014/main" id="{C8578FD1-B651-4D44-4A9A-EAAF684110CF}"/>
+                <a16:creationId xmlns:a16="http://schemas.microsoft.com/office/drawing/2014/main" id="{6F4E5B97-2792-0614-BD4C-B57075754CE8}"/>
               </a:ext>
             </a:extLst>
           </p:cNvPr>
@@ -2170,7 +2064,7 @@
                 <a:tabLst/>
                 <a:defRPr/>
               </a:pPr>
-              <a:t>31</a:t>
+              <a:t>30</a:t>
             </a:fld>
             <a:endParaRPr kumimoji="0" sz="1200" b="0" i="0" u="none" strike="noStrike" kern="0" cap="none" spc="0" normalizeH="0" baseline="0" noProof="0">
               <a:ln>
@@ -2191,7 +2085,117 @@
     </p:spTree>
     <p:extLst>
       <p:ext uri="{BB962C8B-B14F-4D97-AF65-F5344CB8AC3E}">
-        <p14:creationId xmlns:p14="http://schemas.microsoft.com/office/powerpoint/2010/main" val="1821547892"/>
+        <p14:creationId xmlns:p14="http://schemas.microsoft.com/office/powerpoint/2010/main" val="1724071367"/>
+      </p:ext>
+    </p:extLst>
+  </p:cSld>
+  <p:clrMapOvr>
+    <a:masterClrMapping/>
+  </p:clrMapOvr>
+</p:notes>
+</file>
+
+<file path=ppt/notesSlides/notesSlide19.xml><?xml version="1.0" encoding="utf-8"?>
+<p:notes xmlns:a="http://schemas.openxmlformats.org/drawingml/2006/main" xmlns:r="http://schemas.openxmlformats.org/officeDocument/2006/relationships" xmlns:p="http://schemas.openxmlformats.org/presentationml/2006/main">
+  <p:cSld>
+    <p:spTree>
+      <p:nvGrpSpPr>
+        <p:cNvPr id="1" name="">
+          <a:extLst>
+            <a:ext uri="{FF2B5EF4-FFF2-40B4-BE49-F238E27FC236}">
+              <a16:creationId xmlns:a16="http://schemas.microsoft.com/office/drawing/2014/main" id="{7D1D5C83-C1E5-69B4-9CBD-F48D27F30011}"/>
+            </a:ext>
+          </a:extLst>
+        </p:cNvPr>
+        <p:cNvGrpSpPr/>
+        <p:nvPr/>
+      </p:nvGrpSpPr>
+      <p:grpSpPr>
+        <a:xfrm>
+          <a:off x="0" y="0"/>
+          <a:ext cx="0" cy="0"/>
+          <a:chOff x="0" y="0"/>
+          <a:chExt cx="0" cy="0"/>
+        </a:xfrm>
+      </p:grpSpPr>
+      <p:sp>
+        <p:nvSpPr>
+          <p:cNvPr id="2" name="Folienbildplatzhalter 1">
+            <a:extLst>
+              <a:ext uri="{FF2B5EF4-FFF2-40B4-BE49-F238E27FC236}">
+                <a16:creationId xmlns:a16="http://schemas.microsoft.com/office/drawing/2014/main" id="{10E100BD-441E-6730-43F1-7936DAE7494C}"/>
+              </a:ext>
+            </a:extLst>
+          </p:cNvPr>
+          <p:cNvSpPr>
+            <a:spLocks noGrp="1" noRot="1" noChangeAspect="1"/>
+          </p:cNvSpPr>
+          <p:nvPr>
+            <p:ph type="sldImg"/>
+          </p:nvPr>
+        </p:nvSpPr>
+        <p:spPr/>
+      </p:sp>
+      <p:sp>
+        <p:nvSpPr>
+          <p:cNvPr id="3" name="Notizenplatzhalter 2">
+            <a:extLst>
+              <a:ext uri="{FF2B5EF4-FFF2-40B4-BE49-F238E27FC236}">
+                <a16:creationId xmlns:a16="http://schemas.microsoft.com/office/drawing/2014/main" id="{6FA3B23C-CBFF-C6EE-8B98-14E672AB58C0}"/>
+              </a:ext>
+            </a:extLst>
+          </p:cNvPr>
+          <p:cNvSpPr>
+            <a:spLocks noGrp="1"/>
+          </p:cNvSpPr>
+          <p:nvPr>
+            <p:ph type="body" idx="1"/>
+          </p:nvPr>
+        </p:nvSpPr>
+        <p:spPr/>
+        <p:txBody>
+          <a:bodyPr/>
+          <a:lstStyle/>
+          <a:p>
+            <a:r>
+              <a:rPr lang="de-DE"/>
+              <a:t>Hier beginnen wir mit dem Hintergrund und der Motivation für unser Projekt. Wir geben einen Überblick über die Einzelhandelsbranche und erläutern die Zielsetzung unseres Data Science Projekts, um Prozesse zu optimieren und die Effizienz zu steigern.</a:t>
+            </a:r>
+          </a:p>
+        </p:txBody>
+      </p:sp>
+      <p:sp>
+        <p:nvSpPr>
+          <p:cNvPr id="4" name="Foliennummernplatzhalter 3">
+            <a:extLst>
+              <a:ext uri="{FF2B5EF4-FFF2-40B4-BE49-F238E27FC236}">
+                <a16:creationId xmlns:a16="http://schemas.microsoft.com/office/drawing/2014/main" id="{8D321C24-4021-BA5E-5063-DE14E5ECA4EC}"/>
+              </a:ext>
+            </a:extLst>
+          </p:cNvPr>
+          <p:cNvSpPr>
+            <a:spLocks noGrp="1"/>
+          </p:cNvSpPr>
+          <p:nvPr>
+            <p:ph type="sldNum" sz="quarter" idx="5"/>
+          </p:nvPr>
+        </p:nvSpPr>
+        <p:spPr/>
+        <p:txBody>
+          <a:bodyPr/>
+          <a:lstStyle/>
+          <a:p>
+            <a:fld id="{8C36BA74-7AA1-48ED-B9BC-0F570D47A936}" type="slidenum">
+              <a:t>31</a:t>
+            </a:fld>
+            <a:endParaRPr lang="de-DE"/>
+          </a:p>
+        </p:txBody>
+      </p:sp>
+    </p:spTree>
+    <p:extLst>
+      <p:ext uri="{BB962C8B-B14F-4D97-AF65-F5344CB8AC3E}">
+        <p14:creationId xmlns:p14="http://schemas.microsoft.com/office/powerpoint/2010/main" val="1912491895"/>
       </p:ext>
     </p:extLst>
   </p:cSld>
@@ -2319,7 +2323,7 @@
         <p:cNvPr id="1" name="">
           <a:extLst>
             <a:ext uri="{FF2B5EF4-FFF2-40B4-BE49-F238E27FC236}">
-              <a16:creationId xmlns:a16="http://schemas.microsoft.com/office/drawing/2014/main" id="{A2E9F3D3-D5A2-453D-4054-1B6ABEA6DF19}"/>
+              <a16:creationId xmlns:a16="http://schemas.microsoft.com/office/drawing/2014/main" id="{83E06739-1567-B389-27EB-96890F9ECD30}"/>
             </a:ext>
           </a:extLst>
         </p:cNvPr>
@@ -2339,7 +2343,7 @@
           <p:cNvPr id="139090186" name="Slide Image Placeholder 1">
             <a:extLst>
               <a:ext uri="{FF2B5EF4-FFF2-40B4-BE49-F238E27FC236}">
-                <a16:creationId xmlns:a16="http://schemas.microsoft.com/office/drawing/2014/main" id="{13F44863-AC7B-8ABD-AAA9-D819BC1D70C8}"/>
+                <a16:creationId xmlns:a16="http://schemas.microsoft.com/office/drawing/2014/main" id="{932D7566-9A6D-225F-EA98-70101BF44016}"/>
               </a:ext>
             </a:extLst>
           </p:cNvPr>
@@ -2357,7 +2361,7 @@
           <p:cNvPr id="400293583" name="Notes Placeholder 2">
             <a:extLst>
               <a:ext uri="{FF2B5EF4-FFF2-40B4-BE49-F238E27FC236}">
-                <a16:creationId xmlns:a16="http://schemas.microsoft.com/office/drawing/2014/main" id="{13B76D12-19FF-91AA-4941-782F0B7996F1}"/>
+                <a16:creationId xmlns:a16="http://schemas.microsoft.com/office/drawing/2014/main" id="{F2073CA3-EE16-2C99-C6C6-07A0340AA00B}"/>
               </a:ext>
             </a:extLst>
           </p:cNvPr>
@@ -2385,7 +2389,7 @@
           <p:cNvPr id="1257388043" name="Slide Number Placeholder 3">
             <a:extLst>
               <a:ext uri="{FF2B5EF4-FFF2-40B4-BE49-F238E27FC236}">
-                <a16:creationId xmlns:a16="http://schemas.microsoft.com/office/drawing/2014/main" id="{2DB14216-72B6-587D-8E1A-5F4B7D7AA16C}"/>
+                <a16:creationId xmlns:a16="http://schemas.microsoft.com/office/drawing/2014/main" id="{C8578FD1-B651-4D44-4A9A-EAAF684110CF}"/>
               </a:ext>
             </a:extLst>
           </p:cNvPr>
@@ -2470,7 +2474,7 @@
     </p:spTree>
     <p:extLst>
       <p:ext uri="{BB962C8B-B14F-4D97-AF65-F5344CB8AC3E}">
-        <p14:creationId xmlns:p14="http://schemas.microsoft.com/office/powerpoint/2010/main" val="3871987960"/>
+        <p14:creationId xmlns:p14="http://schemas.microsoft.com/office/powerpoint/2010/main" val="1821547892"/>
       </p:ext>
     </p:extLst>
   </p:cSld>
@@ -2488,7 +2492,7 @@
         <p:cNvPr id="1" name="">
           <a:extLst>
             <a:ext uri="{FF2B5EF4-FFF2-40B4-BE49-F238E27FC236}">
-              <a16:creationId xmlns:a16="http://schemas.microsoft.com/office/drawing/2014/main" id="{071F79CF-CD17-6033-1FEF-05B17707F01A}"/>
+              <a16:creationId xmlns:a16="http://schemas.microsoft.com/office/drawing/2014/main" id="{A2E9F3D3-D5A2-453D-4054-1B6ABEA6DF19}"/>
             </a:ext>
           </a:extLst>
         </p:cNvPr>
@@ -2508,7 +2512,7 @@
           <p:cNvPr id="139090186" name="Slide Image Placeholder 1">
             <a:extLst>
               <a:ext uri="{FF2B5EF4-FFF2-40B4-BE49-F238E27FC236}">
-                <a16:creationId xmlns:a16="http://schemas.microsoft.com/office/drawing/2014/main" id="{EE683B9E-A0DE-86F4-BD95-319D8EBFE26F}"/>
+                <a16:creationId xmlns:a16="http://schemas.microsoft.com/office/drawing/2014/main" id="{13F44863-AC7B-8ABD-AAA9-D819BC1D70C8}"/>
               </a:ext>
             </a:extLst>
           </p:cNvPr>
@@ -2526,7 +2530,7 @@
           <p:cNvPr id="400293583" name="Notes Placeholder 2">
             <a:extLst>
               <a:ext uri="{FF2B5EF4-FFF2-40B4-BE49-F238E27FC236}">
-                <a16:creationId xmlns:a16="http://schemas.microsoft.com/office/drawing/2014/main" id="{364C980E-94DA-1FD5-935B-F531D86CBDD4}"/>
+                <a16:creationId xmlns:a16="http://schemas.microsoft.com/office/drawing/2014/main" id="{13B76D12-19FF-91AA-4941-782F0B7996F1}"/>
               </a:ext>
             </a:extLst>
           </p:cNvPr>
@@ -2554,7 +2558,7 @@
           <p:cNvPr id="1257388043" name="Slide Number Placeholder 3">
             <a:extLst>
               <a:ext uri="{FF2B5EF4-FFF2-40B4-BE49-F238E27FC236}">
-                <a16:creationId xmlns:a16="http://schemas.microsoft.com/office/drawing/2014/main" id="{FFBE7416-06B8-8F75-A9EF-A9895DF8107A}"/>
+                <a16:creationId xmlns:a16="http://schemas.microsoft.com/office/drawing/2014/main" id="{2DB14216-72B6-587D-8E1A-5F4B7D7AA16C}"/>
               </a:ext>
             </a:extLst>
           </p:cNvPr>
@@ -2639,7 +2643,7 @@
     </p:spTree>
     <p:extLst>
       <p:ext uri="{BB962C8B-B14F-4D97-AF65-F5344CB8AC3E}">
-        <p14:creationId xmlns:p14="http://schemas.microsoft.com/office/powerpoint/2010/main" val="2318382485"/>
+        <p14:creationId xmlns:p14="http://schemas.microsoft.com/office/powerpoint/2010/main" val="3871987960"/>
       </p:ext>
     </p:extLst>
   </p:cSld>
@@ -2657,7 +2661,7 @@
         <p:cNvPr id="1" name="">
           <a:extLst>
             <a:ext uri="{FF2B5EF4-FFF2-40B4-BE49-F238E27FC236}">
-              <a16:creationId xmlns:a16="http://schemas.microsoft.com/office/drawing/2014/main" id="{69F313CF-1FEC-98D5-3C31-CE6F4B8F6ABF}"/>
+              <a16:creationId xmlns:a16="http://schemas.microsoft.com/office/drawing/2014/main" id="{071F79CF-CD17-6033-1FEF-05B17707F01A}"/>
             </a:ext>
           </a:extLst>
         </p:cNvPr>
@@ -2677,7 +2681,7 @@
           <p:cNvPr id="139090186" name="Slide Image Placeholder 1">
             <a:extLst>
               <a:ext uri="{FF2B5EF4-FFF2-40B4-BE49-F238E27FC236}">
-                <a16:creationId xmlns:a16="http://schemas.microsoft.com/office/drawing/2014/main" id="{3E126841-CF9B-8112-14DF-EF343B2B21B4}"/>
+                <a16:creationId xmlns:a16="http://schemas.microsoft.com/office/drawing/2014/main" id="{EE683B9E-A0DE-86F4-BD95-319D8EBFE26F}"/>
               </a:ext>
             </a:extLst>
           </p:cNvPr>
@@ -2695,7 +2699,7 @@
           <p:cNvPr id="400293583" name="Notes Placeholder 2">
             <a:extLst>
               <a:ext uri="{FF2B5EF4-FFF2-40B4-BE49-F238E27FC236}">
-                <a16:creationId xmlns:a16="http://schemas.microsoft.com/office/drawing/2014/main" id="{BA1A9BCC-D8A0-8BD2-7F2A-D5FDE80127E6}"/>
+                <a16:creationId xmlns:a16="http://schemas.microsoft.com/office/drawing/2014/main" id="{364C980E-94DA-1FD5-935B-F531D86CBDD4}"/>
               </a:ext>
             </a:extLst>
           </p:cNvPr>
@@ -2723,7 +2727,7 @@
           <p:cNvPr id="1257388043" name="Slide Number Placeholder 3">
             <a:extLst>
               <a:ext uri="{FF2B5EF4-FFF2-40B4-BE49-F238E27FC236}">
-                <a16:creationId xmlns:a16="http://schemas.microsoft.com/office/drawing/2014/main" id="{258DFE2D-F19D-0F43-B42D-F1713DB9637F}"/>
+                <a16:creationId xmlns:a16="http://schemas.microsoft.com/office/drawing/2014/main" id="{FFBE7416-06B8-8F75-A9EF-A9895DF8107A}"/>
               </a:ext>
             </a:extLst>
           </p:cNvPr>
@@ -2808,6 +2812,344 @@
     </p:spTree>
     <p:extLst>
       <p:ext uri="{BB962C8B-B14F-4D97-AF65-F5344CB8AC3E}">
+        <p14:creationId xmlns:p14="http://schemas.microsoft.com/office/powerpoint/2010/main" val="2318382485"/>
+      </p:ext>
+    </p:extLst>
+  </p:cSld>
+  <p:clrMapOvr>
+    <a:masterClrMapping/>
+  </p:clrMapOvr>
+</p:notes>
+</file>
+
+<file path=ppt/notesSlides/notesSlide23.xml><?xml version="1.0" encoding="utf-8"?>
+<p:notes xmlns:a="http://schemas.openxmlformats.org/drawingml/2006/main" xmlns:r="http://schemas.openxmlformats.org/officeDocument/2006/relationships" xmlns:p="http://schemas.openxmlformats.org/presentationml/2006/main">
+  <p:cSld>
+    <p:spTree>
+      <p:nvGrpSpPr>
+        <p:cNvPr id="1" name="">
+          <a:extLst>
+            <a:ext uri="{FF2B5EF4-FFF2-40B4-BE49-F238E27FC236}">
+              <a16:creationId xmlns:a16="http://schemas.microsoft.com/office/drawing/2014/main" id="{DA3283D2-DBF6-D5A5-0A46-10E5E73BF7F5}"/>
+            </a:ext>
+          </a:extLst>
+        </p:cNvPr>
+        <p:cNvGrpSpPr/>
+        <p:nvPr/>
+      </p:nvGrpSpPr>
+      <p:grpSpPr bwMode="auto">
+        <a:xfrm>
+          <a:off x="0" y="0"/>
+          <a:ext cx="0" cy="0"/>
+          <a:chOff x="0" y="0"/>
+          <a:chExt cx="0" cy="0"/>
+        </a:xfrm>
+      </p:grpSpPr>
+      <p:sp>
+        <p:nvSpPr>
+          <p:cNvPr id="139090186" name="Slide Image Placeholder 1">
+            <a:extLst>
+              <a:ext uri="{FF2B5EF4-FFF2-40B4-BE49-F238E27FC236}">
+                <a16:creationId xmlns:a16="http://schemas.microsoft.com/office/drawing/2014/main" id="{0A1192E9-FB02-CB2D-DBEF-1A1C4CFD871D}"/>
+              </a:ext>
+            </a:extLst>
+          </p:cNvPr>
+          <p:cNvSpPr>
+            <a:spLocks noGrp="1" noRot="1" noChangeAspect="1"/>
+          </p:cNvSpPr>
+          <p:nvPr>
+            <p:ph type="sldImg"/>
+          </p:nvPr>
+        </p:nvSpPr>
+        <p:spPr bwMode="auto"/>
+      </p:sp>
+      <p:sp>
+        <p:nvSpPr>
+          <p:cNvPr id="400293583" name="Notes Placeholder 2">
+            <a:extLst>
+              <a:ext uri="{FF2B5EF4-FFF2-40B4-BE49-F238E27FC236}">
+                <a16:creationId xmlns:a16="http://schemas.microsoft.com/office/drawing/2014/main" id="{9A9D6D79-C617-A95F-CB9A-C7E9C3EEACA9}"/>
+              </a:ext>
+            </a:extLst>
+          </p:cNvPr>
+          <p:cNvSpPr>
+            <a:spLocks noGrp="1"/>
+          </p:cNvSpPr>
+          <p:nvPr>
+            <p:ph type="body" idx="1"/>
+          </p:nvPr>
+        </p:nvSpPr>
+        <p:spPr bwMode="auto"/>
+        <p:txBody>
+          <a:bodyPr/>
+          <a:lstStyle/>
+          <a:p>
+            <a:pPr>
+              <a:defRPr/>
+            </a:pPr>
+            <a:endParaRPr/>
+          </a:p>
+        </p:txBody>
+      </p:sp>
+      <p:sp>
+        <p:nvSpPr>
+          <p:cNvPr id="1257388043" name="Slide Number Placeholder 3">
+            <a:extLst>
+              <a:ext uri="{FF2B5EF4-FFF2-40B4-BE49-F238E27FC236}">
+                <a16:creationId xmlns:a16="http://schemas.microsoft.com/office/drawing/2014/main" id="{2E5FC565-6F52-C6E6-2CE6-21A3593D4DDC}"/>
+              </a:ext>
+            </a:extLst>
+          </p:cNvPr>
+          <p:cNvSpPr>
+            <a:spLocks noGrp="1"/>
+          </p:cNvSpPr>
+          <p:nvPr>
+            <p:ph type="sldNum" sz="quarter" idx="10"/>
+          </p:nvPr>
+        </p:nvSpPr>
+        <p:spPr bwMode="auto"/>
+        <p:txBody>
+          <a:bodyPr/>
+          <a:lstStyle/>
+          <a:p>
+            <a:pPr marL="0" marR="0" lvl="0" indent="0" algn="r" defTabSz="914400" eaLnBrk="1" fontAlgn="auto" latinLnBrk="0" hangingPunct="1">
+              <a:lnSpc>
+                <a:spcPct val="100000"/>
+              </a:lnSpc>
+              <a:spcBef>
+                <a:spcPts val="0"/>
+              </a:spcBef>
+              <a:spcAft>
+                <a:spcPts val="0"/>
+              </a:spcAft>
+              <a:buClrTx/>
+              <a:buSzTx/>
+              <a:buFontTx/>
+              <a:buNone/>
+              <a:tabLst/>
+              <a:defRPr/>
+            </a:pPr>
+            <a:fld id="{20073075-213A-DC53-9B24-1C6EF3B6ADAB}" type="slidenum">
+              <a:rPr kumimoji="0" sz="1200" b="0" i="0" u="none" strike="noStrike" kern="0" cap="none" spc="0" normalizeH="0" baseline="0" noProof="0">
+                <a:ln>
+                  <a:noFill/>
+                </a:ln>
+                <a:solidFill>
+                  <a:prstClr val="black"/>
+                </a:solidFill>
+                <a:effectLst/>
+                <a:uLnTx/>
+                <a:uFillTx/>
+                <a:latin typeface="Calibri"/>
+                <a:cs typeface="Arial"/>
+              </a:rPr>
+              <a:pPr marL="0" marR="0" lvl="0" indent="0" algn="r" defTabSz="914400" eaLnBrk="1" fontAlgn="auto" latinLnBrk="0" hangingPunct="1">
+                <a:lnSpc>
+                  <a:spcPct val="100000"/>
+                </a:lnSpc>
+                <a:spcBef>
+                  <a:spcPts val="0"/>
+                </a:spcBef>
+                <a:spcAft>
+                  <a:spcPts val="0"/>
+                </a:spcAft>
+                <a:buClrTx/>
+                <a:buSzTx/>
+                <a:buFontTx/>
+                <a:buNone/>
+                <a:tabLst/>
+                <a:defRPr/>
+              </a:pPr>
+              <a:t>35</a:t>
+            </a:fld>
+            <a:endParaRPr kumimoji="0" sz="1200" b="0" i="0" u="none" strike="noStrike" kern="0" cap="none" spc="0" normalizeH="0" baseline="0" noProof="0">
+              <a:ln>
+                <a:noFill/>
+              </a:ln>
+              <a:solidFill>
+                <a:prstClr val="black"/>
+              </a:solidFill>
+              <a:effectLst/>
+              <a:uLnTx/>
+              <a:uFillTx/>
+              <a:latin typeface="Calibri"/>
+              <a:cs typeface="Arial"/>
+            </a:endParaRPr>
+          </a:p>
+        </p:txBody>
+      </p:sp>
+    </p:spTree>
+    <p:extLst>
+      <p:ext uri="{BB962C8B-B14F-4D97-AF65-F5344CB8AC3E}">
+        <p14:creationId xmlns:p14="http://schemas.microsoft.com/office/powerpoint/2010/main" val="284837936"/>
+      </p:ext>
+    </p:extLst>
+  </p:cSld>
+  <p:clrMapOvr>
+    <a:masterClrMapping/>
+  </p:clrMapOvr>
+</p:notes>
+</file>
+
+<file path=ppt/notesSlides/notesSlide24.xml><?xml version="1.0" encoding="utf-8"?>
+<p:notes xmlns:a="http://schemas.openxmlformats.org/drawingml/2006/main" xmlns:r="http://schemas.openxmlformats.org/officeDocument/2006/relationships" xmlns:p="http://schemas.openxmlformats.org/presentationml/2006/main">
+  <p:cSld>
+    <p:spTree>
+      <p:nvGrpSpPr>
+        <p:cNvPr id="1" name="">
+          <a:extLst>
+            <a:ext uri="{FF2B5EF4-FFF2-40B4-BE49-F238E27FC236}">
+              <a16:creationId xmlns:a16="http://schemas.microsoft.com/office/drawing/2014/main" id="{69F313CF-1FEC-98D5-3C31-CE6F4B8F6ABF}"/>
+            </a:ext>
+          </a:extLst>
+        </p:cNvPr>
+        <p:cNvGrpSpPr/>
+        <p:nvPr/>
+      </p:nvGrpSpPr>
+      <p:grpSpPr bwMode="auto">
+        <a:xfrm>
+          <a:off x="0" y="0"/>
+          <a:ext cx="0" cy="0"/>
+          <a:chOff x="0" y="0"/>
+          <a:chExt cx="0" cy="0"/>
+        </a:xfrm>
+      </p:grpSpPr>
+      <p:sp>
+        <p:nvSpPr>
+          <p:cNvPr id="139090186" name="Slide Image Placeholder 1">
+            <a:extLst>
+              <a:ext uri="{FF2B5EF4-FFF2-40B4-BE49-F238E27FC236}">
+                <a16:creationId xmlns:a16="http://schemas.microsoft.com/office/drawing/2014/main" id="{3E126841-CF9B-8112-14DF-EF343B2B21B4}"/>
+              </a:ext>
+            </a:extLst>
+          </p:cNvPr>
+          <p:cNvSpPr>
+            <a:spLocks noGrp="1" noRot="1" noChangeAspect="1"/>
+          </p:cNvSpPr>
+          <p:nvPr>
+            <p:ph type="sldImg"/>
+          </p:nvPr>
+        </p:nvSpPr>
+        <p:spPr bwMode="auto"/>
+      </p:sp>
+      <p:sp>
+        <p:nvSpPr>
+          <p:cNvPr id="400293583" name="Notes Placeholder 2">
+            <a:extLst>
+              <a:ext uri="{FF2B5EF4-FFF2-40B4-BE49-F238E27FC236}">
+                <a16:creationId xmlns:a16="http://schemas.microsoft.com/office/drawing/2014/main" id="{BA1A9BCC-D8A0-8BD2-7F2A-D5FDE80127E6}"/>
+              </a:ext>
+            </a:extLst>
+          </p:cNvPr>
+          <p:cNvSpPr>
+            <a:spLocks noGrp="1"/>
+          </p:cNvSpPr>
+          <p:nvPr>
+            <p:ph type="body" idx="1"/>
+          </p:nvPr>
+        </p:nvSpPr>
+        <p:spPr bwMode="auto"/>
+        <p:txBody>
+          <a:bodyPr/>
+          <a:lstStyle/>
+          <a:p>
+            <a:pPr>
+              <a:defRPr/>
+            </a:pPr>
+            <a:endParaRPr/>
+          </a:p>
+        </p:txBody>
+      </p:sp>
+      <p:sp>
+        <p:nvSpPr>
+          <p:cNvPr id="1257388043" name="Slide Number Placeholder 3">
+            <a:extLst>
+              <a:ext uri="{FF2B5EF4-FFF2-40B4-BE49-F238E27FC236}">
+                <a16:creationId xmlns:a16="http://schemas.microsoft.com/office/drawing/2014/main" id="{258DFE2D-F19D-0F43-B42D-F1713DB9637F}"/>
+              </a:ext>
+            </a:extLst>
+          </p:cNvPr>
+          <p:cNvSpPr>
+            <a:spLocks noGrp="1"/>
+          </p:cNvSpPr>
+          <p:nvPr>
+            <p:ph type="sldNum" sz="quarter" idx="10"/>
+          </p:nvPr>
+        </p:nvSpPr>
+        <p:spPr bwMode="auto"/>
+        <p:txBody>
+          <a:bodyPr/>
+          <a:lstStyle/>
+          <a:p>
+            <a:pPr marL="0" marR="0" lvl="0" indent="0" algn="r" defTabSz="914400" eaLnBrk="1" fontAlgn="auto" latinLnBrk="0" hangingPunct="1">
+              <a:lnSpc>
+                <a:spcPct val="100000"/>
+              </a:lnSpc>
+              <a:spcBef>
+                <a:spcPts val="0"/>
+              </a:spcBef>
+              <a:spcAft>
+                <a:spcPts val="0"/>
+              </a:spcAft>
+              <a:buClrTx/>
+              <a:buSzTx/>
+              <a:buFontTx/>
+              <a:buNone/>
+              <a:tabLst/>
+              <a:defRPr/>
+            </a:pPr>
+            <a:fld id="{20073075-213A-DC53-9B24-1C6EF3B6ADAB}" type="slidenum">
+              <a:rPr kumimoji="0" sz="1200" b="0" i="0" u="none" strike="noStrike" kern="0" cap="none" spc="0" normalizeH="0" baseline="0" noProof="0">
+                <a:ln>
+                  <a:noFill/>
+                </a:ln>
+                <a:solidFill>
+                  <a:prstClr val="black"/>
+                </a:solidFill>
+                <a:effectLst/>
+                <a:uLnTx/>
+                <a:uFillTx/>
+                <a:latin typeface="Calibri"/>
+                <a:cs typeface="Arial"/>
+              </a:rPr>
+              <a:pPr marL="0" marR="0" lvl="0" indent="0" algn="r" defTabSz="914400" eaLnBrk="1" fontAlgn="auto" latinLnBrk="0" hangingPunct="1">
+                <a:lnSpc>
+                  <a:spcPct val="100000"/>
+                </a:lnSpc>
+                <a:spcBef>
+                  <a:spcPts val="0"/>
+                </a:spcBef>
+                <a:spcAft>
+                  <a:spcPts val="0"/>
+                </a:spcAft>
+                <a:buClrTx/>
+                <a:buSzTx/>
+                <a:buFontTx/>
+                <a:buNone/>
+                <a:tabLst/>
+                <a:defRPr/>
+              </a:pPr>
+              <a:t>36</a:t>
+            </a:fld>
+            <a:endParaRPr kumimoji="0" sz="1200" b="0" i="0" u="none" strike="noStrike" kern="0" cap="none" spc="0" normalizeH="0" baseline="0" noProof="0">
+              <a:ln>
+                <a:noFill/>
+              </a:ln>
+              <a:solidFill>
+                <a:prstClr val="black"/>
+              </a:solidFill>
+              <a:effectLst/>
+              <a:uLnTx/>
+              <a:uFillTx/>
+              <a:latin typeface="Calibri"/>
+              <a:cs typeface="Arial"/>
+            </a:endParaRPr>
+          </a:p>
+        </p:txBody>
+      </p:sp>
+    </p:spTree>
+    <p:extLst>
+      <p:ext uri="{BB962C8B-B14F-4D97-AF65-F5344CB8AC3E}">
         <p14:creationId xmlns:p14="http://schemas.microsoft.com/office/powerpoint/2010/main" val="785065613"/>
       </p:ext>
     </p:extLst>
@@ -2818,7 +3160,7 @@
 </p:notes>
 </file>
 
-<file path=ppt/notesSlides/notesSlide23.xml><?xml version="1.0" encoding="utf-8"?>
+<file path=ppt/notesSlides/notesSlide25.xml><?xml version="1.0" encoding="utf-8"?>
 <p:notes xmlns:a="http://schemas.openxmlformats.org/drawingml/2006/main" xmlns:r="http://schemas.openxmlformats.org/officeDocument/2006/relationships" xmlns:p="http://schemas.openxmlformats.org/presentationml/2006/main">
   <p:cSld>
     <p:spTree>
@@ -2909,7 +3251,7 @@
           <a:lstStyle/>
           <a:p>
             <a:fld id="{8C36BA74-7AA1-48ED-B9BC-0F570D47A936}" type="slidenum">
-              <a:t>35</a:t>
+              <a:t>37</a:t>
             </a:fld>
             <a:endParaRPr lang="de-DE"/>
           </a:p>
@@ -4340,7 +4682,7 @@
           <a:p>
             <a:fld id="{4E96B16B-3D02-421E-9A22-E7AF4889F0FE}" type="datetime1">
               <a:rPr lang="en-US" smtClean="0"/>
-              <a:t>6/23/2025</a:t>
+              <a:t>6/24/2025</a:t>
             </a:fld>
             <a:endParaRPr lang="en-US"/>
           </a:p>
@@ -4542,7 +4884,7 @@
           <a:p>
             <a:fld id="{DB775AC6-EFC6-47B7-8612-9DA8DD25D955}" type="datetime1">
               <a:rPr lang="en-US" smtClean="0"/>
-              <a:t>6/23/2025</a:t>
+              <a:t>6/24/2025</a:t>
             </a:fld>
             <a:endParaRPr lang="en-US"/>
           </a:p>
@@ -4886,7 +5228,7 @@
           <a:p>
             <a:fld id="{6AA36526-50D6-4421-A203-614B20CF2703}" type="datetime1">
               <a:rPr lang="en-US" smtClean="0"/>
-              <a:t>6/23/2025</a:t>
+              <a:t>6/24/2025</a:t>
             </a:fld>
             <a:endParaRPr lang="en-US"/>
           </a:p>
@@ -5284,7 +5626,7 @@
             </a:pPr>
             <a:fld id="{4E96B16B-3D02-421E-9A22-E7AF4889F0FE}" type="datetime1">
               <a:rPr lang="en-US"/>
-              <a:t>6/23/2025</a:t>
+              <a:t>6/24/2025</a:t>
             </a:fld>
             <a:endParaRPr lang="en-US"/>
           </a:p>
@@ -5488,7 +5830,7 @@
             </a:pPr>
             <a:fld id="{75E84928-FE16-43B9-BC25-2859501720EA}" type="datetime1">
               <a:rPr lang="en-US"/>
-              <a:t>6/23/2025</a:t>
+              <a:t>6/24/2025</a:t>
             </a:fld>
             <a:endParaRPr lang="en-US"/>
           </a:p>
@@ -5886,7 +6228,7 @@
             </a:pPr>
             <a:fld id="{52B94D21-0962-4C08-BB57-BC7507DEE084}" type="datetime1">
               <a:rPr lang="en-US"/>
-              <a:t>6/23/2025</a:t>
+              <a:t>6/24/2025</a:t>
             </a:fld>
             <a:endParaRPr lang="en-US"/>
           </a:p>
@@ -6334,7 +6676,7 @@
             </a:pPr>
             <a:fld id="{EF075700-B54E-437C-8A31-0CC21845C39D}" type="datetime1">
               <a:rPr lang="en-US"/>
-              <a:t>6/23/2025</a:t>
+              <a:t>6/24/2025</a:t>
             </a:fld>
             <a:endParaRPr lang="en-US"/>
           </a:p>
@@ -6879,7 +7221,7 @@
             </a:pPr>
             <a:fld id="{A7472505-C2E4-4560-87BD-F72139D98800}" type="datetime1">
               <a:rPr lang="en-US"/>
-              <a:t>6/23/2025</a:t>
+              <a:t>6/24/2025</a:t>
             </a:fld>
             <a:endParaRPr lang="en-US"/>
           </a:p>
@@ -7137,7 +7479,7 @@
             </a:pPr>
             <a:fld id="{688C6202-6C0C-4936-9181-C3BAC183F367}" type="datetime1">
               <a:rPr lang="en-US"/>
-              <a:t>6/23/2025</a:t>
+              <a:t>6/24/2025</a:t>
             </a:fld>
             <a:endParaRPr lang="en-US"/>
           </a:p>
@@ -7369,7 +7711,7 @@
             </a:pPr>
             <a:fld id="{B9C3A1C5-5A4D-40F5-AA30-2E2FA551A28A}" type="datetime1">
               <a:rPr lang="en-US"/>
-              <a:t>6/23/2025</a:t>
+              <a:t>6/24/2025</a:t>
             </a:fld>
             <a:endParaRPr lang="en-US"/>
           </a:p>
@@ -7809,7 +8151,7 @@
             </a:pPr>
             <a:fld id="{A3AFC84A-6073-47BB-AA17-B11F88B48FFC}" type="datetime1">
               <a:rPr lang="en-US"/>
-              <a:t>6/23/2025</a:t>
+              <a:t>6/24/2025</a:t>
             </a:fld>
             <a:endParaRPr lang="en-US"/>
           </a:p>
@@ -8134,7 +8476,7 @@
           <a:p>
             <a:fld id="{75E84928-FE16-43B9-BC25-2859501720EA}" type="datetime1">
               <a:rPr lang="en-US" smtClean="0"/>
-              <a:t>6/23/2025</a:t>
+              <a:t>6/24/2025</a:t>
             </a:fld>
             <a:endParaRPr lang="en-US"/>
           </a:p>
@@ -8556,7 +8898,7 @@
             </a:pPr>
             <a:fld id="{049970C6-98BD-4B9C-9DB4-A09FCA6FDD64}" type="datetime1">
               <a:rPr lang="en-US"/>
-              <a:t>6/23/2025</a:t>
+              <a:t>6/24/2025</a:t>
             </a:fld>
             <a:endParaRPr lang="en-US"/>
           </a:p>
@@ -8880,7 +9222,7 @@
             </a:pPr>
             <a:fld id="{DB775AC6-EFC6-47B7-8612-9DA8DD25D955}" type="datetime1">
               <a:rPr lang="en-US"/>
-              <a:t>6/23/2025</a:t>
+              <a:t>6/24/2025</a:t>
             </a:fld>
             <a:endParaRPr lang="en-US"/>
           </a:p>
@@ -9214,7 +9556,7 @@
             </a:pPr>
             <a:fld id="{6AA36526-50D6-4421-A203-614B20CF2703}" type="datetime1">
               <a:rPr lang="en-US"/>
-              <a:t>6/23/2025</a:t>
+              <a:t>6/24/2025</a:t>
             </a:fld>
             <a:endParaRPr lang="en-US"/>
           </a:p>
@@ -9538,7 +9880,7 @@
           <a:p>
             <a:fld id="{52B94D21-0962-4C08-BB57-BC7507DEE084}" type="datetime1">
               <a:rPr lang="en-US" smtClean="0"/>
-              <a:t>6/23/2025</a:t>
+              <a:t>6/24/2025</a:t>
             </a:fld>
             <a:endParaRPr lang="en-US"/>
           </a:p>
@@ -9991,7 +10333,7 @@
           <a:p>
             <a:fld id="{EF075700-B54E-437C-8A31-0CC21845C39D}" type="datetime1">
               <a:rPr lang="en-US" smtClean="0"/>
-              <a:t>6/23/2025</a:t>
+              <a:t>6/24/2025</a:t>
             </a:fld>
             <a:endParaRPr lang="en-US"/>
           </a:p>
@@ -10543,7 +10885,7 @@
           <a:p>
             <a:fld id="{A7472505-C2E4-4560-87BD-F72139D98800}" type="datetime1">
               <a:rPr lang="en-US" smtClean="0"/>
-              <a:t>6/23/2025</a:t>
+              <a:t>6/24/2025</a:t>
             </a:fld>
             <a:endParaRPr lang="en-US"/>
           </a:p>
@@ -10820,7 +11162,7 @@
           <a:p>
             <a:fld id="{688C6202-6C0C-4936-9181-C3BAC183F367}" type="datetime1">
               <a:rPr lang="en-US" smtClean="0"/>
-              <a:t>6/23/2025</a:t>
+              <a:t>6/24/2025</a:t>
             </a:fld>
             <a:endParaRPr lang="en-US"/>
           </a:p>
@@ -11069,7 +11411,7 @@
           <a:p>
             <a:fld id="{B9C3A1C5-5A4D-40F5-AA30-2E2FA551A28A}" type="datetime1">
               <a:rPr lang="en-US" smtClean="0"/>
-              <a:t>6/23/2025</a:t>
+              <a:t>6/24/2025</a:t>
             </a:fld>
             <a:endParaRPr lang="en-US"/>
           </a:p>
@@ -11522,7 +11864,7 @@
           <a:p>
             <a:fld id="{A3AFC84A-6073-47BB-AA17-B11F88B48FFC}" type="datetime1">
               <a:rPr lang="en-US" smtClean="0"/>
-              <a:t>6/23/2025</a:t>
+              <a:t>6/24/2025</a:t>
             </a:fld>
             <a:endParaRPr lang="en-US"/>
           </a:p>
@@ -11950,7 +12292,7 @@
           <a:p>
             <a:fld id="{049970C6-98BD-4B9C-9DB4-A09FCA6FDD64}" type="datetime1">
               <a:rPr lang="en-US" smtClean="0"/>
-              <a:t>6/23/2025</a:t>
+              <a:t>6/24/2025</a:t>
             </a:fld>
             <a:endParaRPr lang="en-US"/>
           </a:p>
@@ -12558,7 +12900,7 @@
           <a:p>
             <a:fld id="{F21DBC69-2876-4ACB-95B6-39F77D4C7E0D}" type="datetime1">
               <a:rPr lang="en-US" smtClean="0"/>
-              <a:t>6/23/2025</a:t>
+              <a:t>6/24/2025</a:t>
             </a:fld>
             <a:r>
               <a:rPr lang="en-US"/>
@@ -13292,7 +13634,7 @@
             </a:pPr>
             <a:fld id="{F21DBC69-2876-4ACB-95B6-39F77D4C7E0D}" type="datetime1">
               <a:rPr lang="en-US"/>
-              <a:t>6/23/2025</a:t>
+              <a:t>6/24/2025</a:t>
             </a:fld>
             <a:r>
               <a:rPr lang="en-US"/>
@@ -15525,7 +15867,7 @@
         <p:fade/>
       </p:transition>
     </mc:Choice>
-    <mc:Fallback xmlns:w="http://schemas.openxmlformats.org/wordprocessingml/2006/main" xmlns:m="http://schemas.openxmlformats.org/officeDocument/2006/math" xmlns="">
+    <mc:Fallback xmlns="" xmlns:m="http://schemas.openxmlformats.org/officeDocument/2006/math" xmlns:w="http://schemas.openxmlformats.org/wordprocessingml/2006/main">
       <p:transition spd="slow" advClick="1">
         <p:fade thruBlk="0"/>
       </p:transition>
@@ -17978,7 +18320,7 @@
         <p:fade/>
       </p:transition>
     </mc:Choice>
-    <mc:Fallback xmlns:w="http://schemas.openxmlformats.org/wordprocessingml/2006/main" xmlns:m="http://schemas.openxmlformats.org/officeDocument/2006/math" xmlns="">
+    <mc:Fallback xmlns="" xmlns:m="http://schemas.openxmlformats.org/officeDocument/2006/math" xmlns:w="http://schemas.openxmlformats.org/wordprocessingml/2006/main">
       <p:transition spd="slow" advClick="1">
         <p:fade thruBlk="0"/>
       </p:transition>
@@ -21142,6 +21484,461 @@
 </file>
 
 <file path=ppt/slides/slide30.xml><?xml version="1.0" encoding="utf-8"?>
+<p:sld xmlns:a="http://schemas.openxmlformats.org/drawingml/2006/main" xmlns:r="http://schemas.openxmlformats.org/officeDocument/2006/relationships" xmlns:p="http://schemas.openxmlformats.org/presentationml/2006/main" showMasterPhAnim="0">
+  <p:cSld>
+    <p:spTree>
+      <p:nvGrpSpPr>
+        <p:cNvPr id="1" name="">
+          <a:extLst>
+            <a:ext uri="{FF2B5EF4-FFF2-40B4-BE49-F238E27FC236}">
+              <a16:creationId xmlns:a16="http://schemas.microsoft.com/office/drawing/2014/main" id="{6B1EE17C-AFCF-CC88-0F34-DD5AF551FC47}"/>
+            </a:ext>
+          </a:extLst>
+        </p:cNvPr>
+        <p:cNvGrpSpPr/>
+        <p:nvPr/>
+      </p:nvGrpSpPr>
+      <p:grpSpPr bwMode="auto">
+        <a:xfrm>
+          <a:off x="0" y="0"/>
+          <a:ext cx="0" cy="0"/>
+          <a:chOff x="0" y="0"/>
+          <a:chExt cx="0" cy="0"/>
+        </a:xfrm>
+      </p:grpSpPr>
+      <p:sp>
+        <p:nvSpPr>
+          <p:cNvPr id="1770641224" name="Title 1">
+            <a:extLst>
+              <a:ext uri="{FF2B5EF4-FFF2-40B4-BE49-F238E27FC236}">
+                <a16:creationId xmlns:a16="http://schemas.microsoft.com/office/drawing/2014/main" id="{4A0A2427-38E6-F6A6-553B-BA9B4E4785D1}"/>
+              </a:ext>
+            </a:extLst>
+          </p:cNvPr>
+          <p:cNvSpPr>
+            <a:spLocks noGrp="1"/>
+          </p:cNvSpPr>
+          <p:nvPr>
+            <p:ph type="title"/>
+          </p:nvPr>
+        </p:nvSpPr>
+        <p:spPr bwMode="auto"/>
+        <p:txBody>
+          <a:bodyPr/>
+          <a:lstStyle/>
+          <a:p>
+            <a:pPr>
+              <a:defRPr/>
+            </a:pPr>
+            <a:r>
+              <a:rPr lang="de-DE" dirty="0"/>
+              <a:t>Zusätzliche Optionen im Modell</a:t>
+            </a:r>
+            <a:endParaRPr dirty="0"/>
+          </a:p>
+        </p:txBody>
+      </p:sp>
+      <p:sp>
+        <p:nvSpPr>
+          <p:cNvPr id="998545421" name="Content Placeholder 2">
+            <a:extLst>
+              <a:ext uri="{FF2B5EF4-FFF2-40B4-BE49-F238E27FC236}">
+                <a16:creationId xmlns:a16="http://schemas.microsoft.com/office/drawing/2014/main" id="{81D3D217-98BA-2A14-A1E1-E8D5FF7633A8}"/>
+              </a:ext>
+            </a:extLst>
+          </p:cNvPr>
+          <p:cNvSpPr>
+            <a:spLocks noGrp="1"/>
+          </p:cNvSpPr>
+          <p:nvPr>
+            <p:ph idx="1"/>
+          </p:nvPr>
+        </p:nvSpPr>
+        <p:spPr bwMode="auto">
+          <a:xfrm>
+            <a:off x="521208" y="2569555"/>
+            <a:ext cx="11155680" cy="3767328"/>
+          </a:xfrm>
+        </p:spPr>
+        <p:txBody>
+          <a:bodyPr/>
+          <a:lstStyle/>
+          <a:p>
+            <a:pPr>
+              <a:defRPr/>
+            </a:pPr>
+            <a:endParaRPr dirty="0"/>
+          </a:p>
+          <a:p>
+            <a:pPr>
+              <a:defRPr sz="1800">
+                <a:solidFill>
+                  <a:srgbClr val="000000"/>
+                </a:solidFill>
+              </a:defRPr>
+            </a:pPr>
+            <a:endParaRPr dirty="0"/>
+          </a:p>
+        </p:txBody>
+      </p:sp>
+      <p:sp>
+        <p:nvSpPr>
+          <p:cNvPr id="2147178039" name="Content Placeholder 2">
+            <a:extLst>
+              <a:ext uri="{FF2B5EF4-FFF2-40B4-BE49-F238E27FC236}">
+                <a16:creationId xmlns:a16="http://schemas.microsoft.com/office/drawing/2014/main" id="{E519BBD9-F3AF-C23F-0EA8-66713F64EC8E}"/>
+              </a:ext>
+            </a:extLst>
+          </p:cNvPr>
+          <p:cNvSpPr>
+            <a:spLocks noGrp="1"/>
+          </p:cNvSpPr>
+          <p:nvPr/>
+        </p:nvSpPr>
+        <p:spPr bwMode="auto">
+          <a:xfrm>
+            <a:off x="592205" y="1676731"/>
+            <a:ext cx="10761595" cy="4381168"/>
+          </a:xfrm>
+        </p:spPr>
+        <p:txBody>
+          <a:bodyPr vertOverflow="overflow" horzOverflow="overflow" vert="horz" wrap="square" lIns="91440" tIns="45720" rIns="91440" bIns="45720" numCol="1" spcCol="0" rtlCol="0" fromWordArt="0" anchor="t" anchorCtr="0" forceAA="0" compatLnSpc="0">
+            <a:normAutofit fontScale="95000"/>
+          </a:bodyPr>
+          <a:lstStyle>
+            <a:lvl1pPr marL="228600" indent="-228600" algn="l" defTabSz="914400">
+              <a:lnSpc>
+                <a:spcPct val="110000"/>
+              </a:lnSpc>
+              <a:spcBef>
+                <a:spcPts val="999"/>
+              </a:spcBef>
+              <a:buFont typeface="Arial"/>
+              <a:buChar char="•"/>
+              <a:defRPr sz="1800">
+                <a:solidFill>
+                  <a:schemeClr val="tx1"/>
+                </a:solidFill>
+                <a:latin typeface="+mn-lt"/>
+                <a:ea typeface="+mn-ea"/>
+                <a:cs typeface="+mn-cs"/>
+              </a:defRPr>
+            </a:lvl1pPr>
+            <a:lvl2pPr marL="685800" indent="-228600" algn="l" defTabSz="914400">
+              <a:lnSpc>
+                <a:spcPct val="110000"/>
+              </a:lnSpc>
+              <a:spcBef>
+                <a:spcPts val="499"/>
+              </a:spcBef>
+              <a:buFont typeface="Arial"/>
+              <a:buChar char="•"/>
+              <a:defRPr sz="1600">
+                <a:solidFill>
+                  <a:schemeClr val="tx1"/>
+                </a:solidFill>
+                <a:latin typeface="+mn-lt"/>
+                <a:ea typeface="+mn-ea"/>
+                <a:cs typeface="+mn-cs"/>
+              </a:defRPr>
+            </a:lvl2pPr>
+            <a:lvl3pPr marL="1143000" indent="-228600" algn="l" defTabSz="914400">
+              <a:lnSpc>
+                <a:spcPct val="110000"/>
+              </a:lnSpc>
+              <a:spcBef>
+                <a:spcPts val="499"/>
+              </a:spcBef>
+              <a:buFont typeface="Arial"/>
+              <a:buChar char="•"/>
+              <a:defRPr sz="1400">
+                <a:solidFill>
+                  <a:schemeClr val="tx1"/>
+                </a:solidFill>
+                <a:latin typeface="+mn-lt"/>
+                <a:ea typeface="+mn-ea"/>
+                <a:cs typeface="+mn-cs"/>
+              </a:defRPr>
+            </a:lvl3pPr>
+            <a:lvl4pPr marL="1600200" indent="-228600" algn="l" defTabSz="914400">
+              <a:lnSpc>
+                <a:spcPct val="110000"/>
+              </a:lnSpc>
+              <a:spcBef>
+                <a:spcPts val="499"/>
+              </a:spcBef>
+              <a:buFont typeface="Arial"/>
+              <a:buChar char="•"/>
+              <a:defRPr sz="1200">
+                <a:solidFill>
+                  <a:schemeClr val="tx1"/>
+                </a:solidFill>
+                <a:latin typeface="+mn-lt"/>
+                <a:ea typeface="+mn-ea"/>
+                <a:cs typeface="+mn-cs"/>
+              </a:defRPr>
+            </a:lvl4pPr>
+            <a:lvl5pPr marL="2057400" indent="-228600" algn="l" defTabSz="914400">
+              <a:lnSpc>
+                <a:spcPct val="110000"/>
+              </a:lnSpc>
+              <a:spcBef>
+                <a:spcPts val="499"/>
+              </a:spcBef>
+              <a:buFont typeface="Arial"/>
+              <a:buChar char="•"/>
+              <a:defRPr sz="1200">
+                <a:solidFill>
+                  <a:schemeClr val="tx1"/>
+                </a:solidFill>
+                <a:latin typeface="+mn-lt"/>
+                <a:ea typeface="+mn-ea"/>
+                <a:cs typeface="+mn-cs"/>
+              </a:defRPr>
+            </a:lvl5pPr>
+            <a:lvl6pPr marL="2514599" indent="-228600" algn="l" defTabSz="914400">
+              <a:lnSpc>
+                <a:spcPct val="90000"/>
+              </a:lnSpc>
+              <a:spcBef>
+                <a:spcPts val="499"/>
+              </a:spcBef>
+              <a:buFont typeface="Arial"/>
+              <a:buChar char="•"/>
+              <a:defRPr sz="1800">
+                <a:solidFill>
+                  <a:schemeClr val="tx1"/>
+                </a:solidFill>
+                <a:latin typeface="+mn-lt"/>
+                <a:ea typeface="+mn-ea"/>
+                <a:cs typeface="+mn-cs"/>
+              </a:defRPr>
+            </a:lvl6pPr>
+            <a:lvl7pPr marL="2971800" indent="-228600" algn="l" defTabSz="914400">
+              <a:lnSpc>
+                <a:spcPct val="90000"/>
+              </a:lnSpc>
+              <a:spcBef>
+                <a:spcPts val="499"/>
+              </a:spcBef>
+              <a:buFont typeface="Arial"/>
+              <a:buChar char="•"/>
+              <a:defRPr sz="1800">
+                <a:solidFill>
+                  <a:schemeClr val="tx1"/>
+                </a:solidFill>
+                <a:latin typeface="+mn-lt"/>
+                <a:ea typeface="+mn-ea"/>
+                <a:cs typeface="+mn-cs"/>
+              </a:defRPr>
+            </a:lvl7pPr>
+            <a:lvl8pPr marL="3429000" indent="-228600" algn="l" defTabSz="914400">
+              <a:lnSpc>
+                <a:spcPct val="90000"/>
+              </a:lnSpc>
+              <a:spcBef>
+                <a:spcPts val="499"/>
+              </a:spcBef>
+              <a:buFont typeface="Arial"/>
+              <a:buChar char="•"/>
+              <a:defRPr sz="1800">
+                <a:solidFill>
+                  <a:schemeClr val="tx1"/>
+                </a:solidFill>
+                <a:latin typeface="+mn-lt"/>
+                <a:ea typeface="+mn-ea"/>
+                <a:cs typeface="+mn-cs"/>
+              </a:defRPr>
+            </a:lvl8pPr>
+            <a:lvl9pPr marL="3886200" indent="-228600" algn="l" defTabSz="914400">
+              <a:lnSpc>
+                <a:spcPct val="90000"/>
+              </a:lnSpc>
+              <a:spcBef>
+                <a:spcPts val="499"/>
+              </a:spcBef>
+              <a:buFont typeface="Arial"/>
+              <a:buChar char="•"/>
+              <a:defRPr sz="1800">
+                <a:solidFill>
+                  <a:schemeClr val="tx1"/>
+                </a:solidFill>
+                <a:latin typeface="+mn-lt"/>
+                <a:ea typeface="+mn-ea"/>
+                <a:cs typeface="+mn-cs"/>
+              </a:defRPr>
+            </a:lvl9pPr>
+          </a:lstStyle>
+          <a:p>
+            <a:pPr marL="0" marR="0" lvl="0" indent="0" algn="l" defTabSz="914400" eaLnBrk="1" fontAlgn="auto" latinLnBrk="0" hangingPunct="1">
+              <a:lnSpc>
+                <a:spcPct val="110000"/>
+              </a:lnSpc>
+              <a:spcBef>
+                <a:spcPts val="999"/>
+              </a:spcBef>
+              <a:spcAft>
+                <a:spcPts val="0"/>
+              </a:spcAft>
+              <a:buClrTx/>
+              <a:buSzTx/>
+              <a:buFont typeface="Arial"/>
+              <a:buNone/>
+              <a:tabLst/>
+              <a:defRPr sz="1800">
+                <a:solidFill>
+                  <a:srgbClr val="000000"/>
+                </a:solidFill>
+              </a:defRPr>
+            </a:pPr>
+            <a:endParaRPr kumimoji="0" sz="1600" b="0" i="0" u="none" strike="noStrike" kern="0" cap="none" spc="0" normalizeH="0" baseline="0" noProof="0" dirty="0">
+              <a:ln>
+                <a:noFill/>
+              </a:ln>
+              <a:solidFill>
+                <a:srgbClr val="000000"/>
+              </a:solidFill>
+              <a:effectLst/>
+              <a:uLnTx/>
+              <a:uFillTx/>
+              <a:latin typeface="Bierstadt"/>
+              <a:cs typeface="Arial"/>
+            </a:endParaRPr>
+          </a:p>
+          <a:p>
+            <a:pPr marR="0" lvl="0" eaLnBrk="1" fontAlgn="auto" latinLnBrk="0" hangingPunct="1">
+              <a:lnSpc>
+                <a:spcPct val="111000"/>
+              </a:lnSpc>
+              <a:spcBef>
+                <a:spcPts val="999"/>
+              </a:spcBef>
+              <a:spcAft>
+                <a:spcPts val="0"/>
+              </a:spcAft>
+              <a:buClrTx/>
+              <a:buSzTx/>
+              <a:tabLst/>
+              <a:defRPr/>
+            </a:pPr>
+            <a:r>
+              <a:rPr lang="de-DE" sz="1900" dirty="0"/>
+              <a:t>Neben den aktuell fixen Werten als Belohnung bzw. Bestrafung für richtig erkannte bzw. fälschlich als Betrug markierte Transaktionen können im Funktionstraining beliebige andere Werte verwendet werden</a:t>
+            </a:r>
+          </a:p>
+          <a:p>
+            <a:pPr marR="0" lvl="0" eaLnBrk="1" fontAlgn="auto" latinLnBrk="0" hangingPunct="1">
+              <a:lnSpc>
+                <a:spcPct val="111000"/>
+              </a:lnSpc>
+              <a:spcBef>
+                <a:spcPts val="999"/>
+              </a:spcBef>
+              <a:spcAft>
+                <a:spcPts val="0"/>
+              </a:spcAft>
+              <a:buClrTx/>
+              <a:buSzTx/>
+              <a:tabLst/>
+              <a:defRPr/>
+            </a:pPr>
+            <a:endParaRPr lang="de-DE" sz="1900" dirty="0"/>
+          </a:p>
+          <a:p>
+            <a:pPr marR="0" lvl="0" eaLnBrk="1" fontAlgn="auto" latinLnBrk="0" hangingPunct="1">
+              <a:lnSpc>
+                <a:spcPct val="111000"/>
+              </a:lnSpc>
+              <a:spcBef>
+                <a:spcPts val="999"/>
+              </a:spcBef>
+              <a:spcAft>
+                <a:spcPts val="0"/>
+              </a:spcAft>
+              <a:buClrTx/>
+              <a:buSzTx/>
+              <a:tabLst/>
+              <a:defRPr/>
+            </a:pPr>
+            <a:r>
+              <a:rPr lang="de-DE" sz="1900" dirty="0"/>
+              <a:t>Das so neu trainierte Modell kann das alte Modell in der Schnittstelle ersetzen</a:t>
+            </a:r>
+          </a:p>
+          <a:p>
+            <a:pPr marR="0" lvl="0" eaLnBrk="1" fontAlgn="auto" latinLnBrk="0" hangingPunct="1">
+              <a:lnSpc>
+                <a:spcPct val="111000"/>
+              </a:lnSpc>
+              <a:spcBef>
+                <a:spcPts val="999"/>
+              </a:spcBef>
+              <a:spcAft>
+                <a:spcPts val="0"/>
+              </a:spcAft>
+              <a:buClrTx/>
+              <a:buSzTx/>
+              <a:tabLst/>
+              <a:defRPr/>
+            </a:pPr>
+            <a:endParaRPr lang="de-DE" sz="1900" dirty="0"/>
+          </a:p>
+          <a:p>
+            <a:pPr marR="0" lvl="0" eaLnBrk="1" fontAlgn="auto" latinLnBrk="0" hangingPunct="1">
+              <a:lnSpc>
+                <a:spcPct val="111000"/>
+              </a:lnSpc>
+              <a:spcBef>
+                <a:spcPts val="999"/>
+              </a:spcBef>
+              <a:spcAft>
+                <a:spcPts val="0"/>
+              </a:spcAft>
+              <a:buClrTx/>
+              <a:buSzTx/>
+              <a:tabLst/>
+              <a:defRPr/>
+            </a:pPr>
+            <a:r>
+              <a:rPr lang="de-DE" sz="1900" dirty="0"/>
+              <a:t>Die für Rabattbetrug auffälligen Produktkategorien können per Schnittstelle an das Modell übergeben werden, sodass Rabatte in Kombination mit diesen Produktkategorien als Betrug (statisch) bewertet werden</a:t>
+            </a:r>
+            <a:endParaRPr lang="de-DE" sz="1700" dirty="0"/>
+          </a:p>
+          <a:p>
+            <a:pPr marR="0" lvl="0" eaLnBrk="1" fontAlgn="auto" latinLnBrk="0" hangingPunct="1">
+              <a:lnSpc>
+                <a:spcPct val="111000"/>
+              </a:lnSpc>
+              <a:spcBef>
+                <a:spcPts val="999"/>
+              </a:spcBef>
+              <a:spcAft>
+                <a:spcPts val="0"/>
+              </a:spcAft>
+              <a:buClrTx/>
+              <a:buSzTx/>
+              <a:tabLst/>
+              <a:defRPr/>
+            </a:pPr>
+            <a:endParaRPr lang="de-DE" sz="1900" dirty="0"/>
+          </a:p>
+        </p:txBody>
+      </p:sp>
+    </p:spTree>
+    <p:extLst>
+      <p:ext uri="{BB962C8B-B14F-4D97-AF65-F5344CB8AC3E}">
+        <p14:creationId xmlns:p14="http://schemas.microsoft.com/office/powerpoint/2010/main" val="3599803741"/>
+      </p:ext>
+    </p:extLst>
+  </p:cSld>
+  <p:clrMapOvr>
+    <a:masterClrMapping/>
+  </p:clrMapOvr>
+</p:sld>
+</file>
+
+<file path=ppt/slides/slide31.xml><?xml version="1.0" encoding="utf-8"?>
 <p:sld xmlns:a="http://schemas.openxmlformats.org/drawingml/2006/main" xmlns:r="http://schemas.openxmlformats.org/officeDocument/2006/relationships" xmlns:p="http://schemas.openxmlformats.org/presentationml/2006/main">
   <p:cSld>
     <p:bg>
@@ -21544,7 +22341,7 @@
 </p:sld>
 </file>
 
-<file path=ppt/slides/slide31.xml><?xml version="1.0" encoding="utf-8"?>
+<file path=ppt/slides/slide32.xml><?xml version="1.0" encoding="utf-8"?>
 <p:sld xmlns:a="http://schemas.openxmlformats.org/drawingml/2006/main" xmlns:r="http://schemas.openxmlformats.org/officeDocument/2006/relationships" xmlns:p="http://schemas.openxmlformats.org/presentationml/2006/main" showMasterPhAnim="0">
   <p:cSld>
     <p:spTree>
@@ -22061,7 +22858,7 @@
 </p:sld>
 </file>
 
-<file path=ppt/slides/slide32.xml><?xml version="1.0" encoding="utf-8"?>
+<file path=ppt/slides/slide33.xml><?xml version="1.0" encoding="utf-8"?>
 <p:sld xmlns:a="http://schemas.openxmlformats.org/drawingml/2006/main" xmlns:r="http://schemas.openxmlformats.org/officeDocument/2006/relationships" xmlns:p="http://schemas.openxmlformats.org/presentationml/2006/main" showMasterPhAnim="0">
   <p:cSld>
     <p:spTree>
@@ -22509,7 +23306,7 @@
 </p:sld>
 </file>
 
-<file path=ppt/slides/slide33.xml><?xml version="1.0" encoding="utf-8"?>
+<file path=ppt/slides/slide34.xml><?xml version="1.0" encoding="utf-8"?>
 <p:sld xmlns:a="http://schemas.openxmlformats.org/drawingml/2006/main" xmlns:r="http://schemas.openxmlformats.org/officeDocument/2006/relationships" xmlns:p="http://schemas.openxmlformats.org/presentationml/2006/main" showMasterPhAnim="0">
   <p:cSld>
     <p:spTree>
@@ -22558,7 +23355,7 @@
             </a:pPr>
             <a:r>
               <a:rPr lang="de-DE" dirty="0"/>
-              <a:t>Sensitivitätsanalyse: Einflussfaktoren im Modell</a:t>
+              <a:t>Sensitivitätsanalyse: Einflussfaktoren im Modell (1)</a:t>
             </a:r>
             <a:endParaRPr dirty="0"/>
           </a:p>
@@ -23086,7 +23883,178 @@
 </p:sld>
 </file>
 
-<file path=ppt/slides/slide34.xml><?xml version="1.0" encoding="utf-8"?>
+<file path=ppt/slides/slide35.xml><?xml version="1.0" encoding="utf-8"?>
+<p:sld xmlns:a="http://schemas.openxmlformats.org/drawingml/2006/main" xmlns:r="http://schemas.openxmlformats.org/officeDocument/2006/relationships" xmlns:p="http://schemas.openxmlformats.org/presentationml/2006/main" showMasterPhAnim="0">
+  <p:cSld>
+    <p:spTree>
+      <p:nvGrpSpPr>
+        <p:cNvPr id="1" name="">
+          <a:extLst>
+            <a:ext uri="{FF2B5EF4-FFF2-40B4-BE49-F238E27FC236}">
+              <a16:creationId xmlns:a16="http://schemas.microsoft.com/office/drawing/2014/main" id="{DC3BED0E-8E13-12B4-CB60-6F3F5CEA6337}"/>
+            </a:ext>
+          </a:extLst>
+        </p:cNvPr>
+        <p:cNvGrpSpPr/>
+        <p:nvPr/>
+      </p:nvGrpSpPr>
+      <p:grpSpPr bwMode="auto">
+        <a:xfrm>
+          <a:off x="0" y="0"/>
+          <a:ext cx="0" cy="0"/>
+          <a:chOff x="0" y="0"/>
+          <a:chExt cx="0" cy="0"/>
+        </a:xfrm>
+      </p:grpSpPr>
+      <p:sp>
+        <p:nvSpPr>
+          <p:cNvPr id="1770641224" name="Title 1">
+            <a:extLst>
+              <a:ext uri="{FF2B5EF4-FFF2-40B4-BE49-F238E27FC236}">
+                <a16:creationId xmlns:a16="http://schemas.microsoft.com/office/drawing/2014/main" id="{BAEA6523-563A-59A1-FF2D-C597B8D2BA71}"/>
+              </a:ext>
+            </a:extLst>
+          </p:cNvPr>
+          <p:cNvSpPr>
+            <a:spLocks noGrp="1"/>
+          </p:cNvSpPr>
+          <p:nvPr>
+            <p:ph type="title"/>
+          </p:nvPr>
+        </p:nvSpPr>
+        <p:spPr bwMode="auto"/>
+        <p:txBody>
+          <a:bodyPr/>
+          <a:lstStyle/>
+          <a:p>
+            <a:pPr>
+              <a:defRPr/>
+            </a:pPr>
+            <a:r>
+              <a:rPr lang="de-DE" dirty="0"/>
+              <a:t>Sensitivitätsanalyse: Einflussfaktoren im Modell (2)</a:t>
+            </a:r>
+            <a:endParaRPr dirty="0"/>
+          </a:p>
+        </p:txBody>
+      </p:sp>
+      <p:sp>
+        <p:nvSpPr>
+          <p:cNvPr id="998545421" name="Content Placeholder 2">
+            <a:extLst>
+              <a:ext uri="{FF2B5EF4-FFF2-40B4-BE49-F238E27FC236}">
+                <a16:creationId xmlns:a16="http://schemas.microsoft.com/office/drawing/2014/main" id="{0E6FFE3B-CF46-AAB9-A3F7-02DCF17D8AD7}"/>
+              </a:ext>
+            </a:extLst>
+          </p:cNvPr>
+          <p:cNvSpPr>
+            <a:spLocks noGrp="1"/>
+          </p:cNvSpPr>
+          <p:nvPr>
+            <p:ph idx="1"/>
+          </p:nvPr>
+        </p:nvSpPr>
+        <p:spPr bwMode="auto">
+          <a:xfrm>
+            <a:off x="521208" y="2569555"/>
+            <a:ext cx="11155680" cy="3767328"/>
+          </a:xfrm>
+        </p:spPr>
+        <p:txBody>
+          <a:bodyPr/>
+          <a:lstStyle/>
+          <a:p>
+            <a:pPr>
+              <a:defRPr/>
+            </a:pPr>
+            <a:endParaRPr dirty="0"/>
+          </a:p>
+          <a:p>
+            <a:pPr>
+              <a:defRPr sz="1800">
+                <a:solidFill>
+                  <a:srgbClr val="000000"/>
+                </a:solidFill>
+              </a:defRPr>
+            </a:pPr>
+            <a:endParaRPr dirty="0"/>
+          </a:p>
+        </p:txBody>
+      </p:sp>
+      <p:pic>
+        <p:nvPicPr>
+          <p:cNvPr id="4" name="Grafik 3">
+            <a:extLst>
+              <a:ext uri="{FF2B5EF4-FFF2-40B4-BE49-F238E27FC236}">
+                <a16:creationId xmlns:a16="http://schemas.microsoft.com/office/drawing/2014/main" id="{379A2697-446A-E5F4-A0B5-5988AD4D4394}"/>
+              </a:ext>
+            </a:extLst>
+          </p:cNvPr>
+          <p:cNvPicPr>
+            <a:picLocks noChangeAspect="1"/>
+          </p:cNvPicPr>
+          <p:nvPr/>
+        </p:nvPicPr>
+        <p:blipFill>
+          <a:blip r:embed="rId3"/>
+          <a:stretch>
+            <a:fillRect/>
+          </a:stretch>
+        </p:blipFill>
+        <p:spPr>
+          <a:xfrm>
+            <a:off x="265470" y="2722164"/>
+            <a:ext cx="5879773" cy="2885872"/>
+          </a:xfrm>
+          <a:prstGeom prst="rect">
+            <a:avLst/>
+          </a:prstGeom>
+        </p:spPr>
+      </p:pic>
+      <p:pic>
+        <p:nvPicPr>
+          <p:cNvPr id="6" name="Grafik 5">
+            <a:extLst>
+              <a:ext uri="{FF2B5EF4-FFF2-40B4-BE49-F238E27FC236}">
+                <a16:creationId xmlns:a16="http://schemas.microsoft.com/office/drawing/2014/main" id="{9D5BD3DA-B555-8F0C-239C-05F6096E14A5}"/>
+              </a:ext>
+            </a:extLst>
+          </p:cNvPr>
+          <p:cNvPicPr>
+            <a:picLocks noChangeAspect="1"/>
+          </p:cNvPicPr>
+          <p:nvPr/>
+        </p:nvPicPr>
+        <p:blipFill>
+          <a:blip r:embed="rId4"/>
+          <a:stretch>
+            <a:fillRect/>
+          </a:stretch>
+        </p:blipFill>
+        <p:spPr>
+          <a:xfrm>
+            <a:off x="6195747" y="2722164"/>
+            <a:ext cx="5386652" cy="2956480"/>
+          </a:xfrm>
+          <a:prstGeom prst="rect">
+            <a:avLst/>
+          </a:prstGeom>
+        </p:spPr>
+      </p:pic>
+    </p:spTree>
+    <p:extLst>
+      <p:ext uri="{BB962C8B-B14F-4D97-AF65-F5344CB8AC3E}">
+        <p14:creationId xmlns:p14="http://schemas.microsoft.com/office/powerpoint/2010/main" val="3702602659"/>
+      </p:ext>
+    </p:extLst>
+  </p:cSld>
+  <p:clrMapOvr>
+    <a:masterClrMapping/>
+  </p:clrMapOvr>
+</p:sld>
+</file>
+
+<file path=ppt/slides/slide36.xml><?xml version="1.0" encoding="utf-8"?>
 <p:sld xmlns:a="http://schemas.openxmlformats.org/drawingml/2006/main" xmlns:r="http://schemas.openxmlformats.org/officeDocument/2006/relationships" xmlns:p="http://schemas.openxmlformats.org/presentationml/2006/main" showMasterPhAnim="0">
   <p:cSld>
     <p:spTree>
@@ -23555,7 +24523,7 @@
 </p:sld>
 </file>
 
-<file path=ppt/slides/slide35.xml><?xml version="1.0" encoding="utf-8"?>
+<file path=ppt/slides/slide37.xml><?xml version="1.0" encoding="utf-8"?>
 <p:sld xmlns:a="http://schemas.openxmlformats.org/drawingml/2006/main" xmlns:r="http://schemas.openxmlformats.org/officeDocument/2006/relationships" xmlns:p="http://schemas.openxmlformats.org/presentationml/2006/main">
   <p:cSld>
     <p:bg>
@@ -23958,7 +24926,7 @@
 </p:sld>
 </file>
 
-<file path=ppt/slides/slide36.xml><?xml version="1.0" encoding="utf-8"?>
+<file path=ppt/slides/slide38.xml><?xml version="1.0" encoding="utf-8"?>
 <p:sld xmlns:a="http://schemas.openxmlformats.org/drawingml/2006/main" xmlns:r="http://schemas.openxmlformats.org/officeDocument/2006/relationships" xmlns:p="http://schemas.openxmlformats.org/presentationml/2006/main">
   <p:cSld>
     <p:spTree>
@@ -24164,7 +25132,7 @@
 </p:sld>
 </file>
 
-<file path=ppt/slides/slide37.xml><?xml version="1.0" encoding="utf-8"?>
+<file path=ppt/slides/slide39.xml><?xml version="1.0" encoding="utf-8"?>
 <p:sld xmlns:a="http://schemas.openxmlformats.org/drawingml/2006/main" xmlns:r="http://schemas.openxmlformats.org/officeDocument/2006/relationships" xmlns:p="http://schemas.openxmlformats.org/presentationml/2006/main">
   <p:cSld>
     <p:spTree>

</xml_diff>